<commit_message>
Added Week 3 Day 2 materials
</commit_message>
<xml_diff>
--- a/Training Materials/Week 2/Day 5/3. Introduction to MongoDB/Slides/3. The Mongo Shell/3-mongodb-introduction-m2-slides.pptx
+++ b/Training Materials/Week 2/Day 5/3. Introduction to MongoDB/Slides/3. The Mongo Shell/3-mongodb-introduction-m2-slides.pptx
@@ -5173,7 +5173,7 @@
         <p:spPr>
           <a:xfrm>
             <a:off x="3048000" y="4343400"/>
-            <a:ext cx="5295900" cy="1515110"/>
+            <a:ext cx="5295900" cy="1878330"/>
           </a:xfrm>
           <a:prstGeom prst="rect">
             <a:avLst/>
@@ -5581,7 +5581,25 @@
                 <a:latin typeface="Tahoma" panose="020B0604030504040204"/>
                 <a:cs typeface="Tahoma" panose="020B0604030504040204"/>
               </a:rPr>
-              <a:t>){}  </a:t>
+              <a:t>){}</a:t>
+            </a:r>
+            <a:endParaRPr sz="2000" b="1" spc="-434" dirty="0">
+              <a:latin typeface="Tahoma" panose="020B0604030504040204"/>
+              <a:cs typeface="Tahoma" panose="020B0604030504040204"/>
+            </a:endParaRPr>
+          </a:p>
+          <a:p>
+            <a:pPr marL="91440" marR="1263650">
+              <a:lnSpc>
+                <a:spcPct val="120000"/>
+              </a:lnSpc>
+            </a:pPr>
+            <a:r>
+              <a:rPr sz="2000" b="1" spc="-434" dirty="0">
+                <a:latin typeface="Tahoma" panose="020B0604030504040204"/>
+                <a:cs typeface="Tahoma" panose="020B0604030504040204"/>
+              </a:rPr>
+              <a:t> </a:t>
             </a:r>
             <a:r>
               <a:rPr sz="2000" b="1" spc="-190" dirty="0">

</xml_diff>